<commit_message>
Added demo videos to demo 1
</commit_message>
<xml_diff>
--- a/graphics/graphics.pptx
+++ b/graphics/graphics.pptx
@@ -6,7 +6,8 @@
   </p:sldMasterIdLst>
   <p:sldIdLst>
     <p:sldId id="256" r:id="rId2"/>
-    <p:sldId id="257" r:id="rId3"/>
+    <p:sldId id="258" r:id="rId3"/>
+    <p:sldId id="257" r:id="rId4"/>
   </p:sldIdLst>
   <p:sldSz cx="12192000" cy="6858000"/>
   <p:notesSz cx="6858000" cy="9144000"/>
@@ -3558,6 +3559,187 @@
       </p:grpSpPr>
       <p:sp>
         <p:nvSpPr>
+          <p:cNvPr id="9" name="Rectangle 8">
+            <a:extLst>
+              <a:ext uri="{FF2B5EF4-FFF2-40B4-BE49-F238E27FC236}">
+                <a16:creationId xmlns:a16="http://schemas.microsoft.com/office/drawing/2014/main" id="{B100DE9A-4601-8E45-A929-090520468135}"/>
+              </a:ext>
+            </a:extLst>
+          </p:cNvPr>
+          <p:cNvSpPr/>
+          <p:nvPr/>
+        </p:nvSpPr>
+        <p:spPr>
+          <a:xfrm>
+            <a:off x="0" y="0"/>
+            <a:ext cx="12192000" cy="6858000"/>
+          </a:xfrm>
+          <a:prstGeom prst="rect">
+            <a:avLst/>
+          </a:prstGeom>
+          <a:solidFill>
+            <a:schemeClr val="tx1">
+              <a:lumMod val="75000"/>
+              <a:lumOff val="25000"/>
+            </a:schemeClr>
+          </a:solidFill>
+        </p:spPr>
+        <p:style>
+          <a:lnRef idx="2">
+            <a:schemeClr val="accent1">
+              <a:shade val="50000"/>
+            </a:schemeClr>
+          </a:lnRef>
+          <a:fillRef idx="1">
+            <a:schemeClr val="accent1"/>
+          </a:fillRef>
+          <a:effectRef idx="0">
+            <a:schemeClr val="accent1"/>
+          </a:effectRef>
+          <a:fontRef idx="minor">
+            <a:schemeClr val="lt1"/>
+          </a:fontRef>
+        </p:style>
+        <p:txBody>
+          <a:bodyPr rtlCol="0" anchor="ctr"/>
+          <a:lstStyle/>
+          <a:p>
+            <a:pPr algn="ctr"/>
+            <a:endParaRPr lang="en-US"/>
+          </a:p>
+        </p:txBody>
+      </p:sp>
+      <p:sp>
+        <p:nvSpPr>
+          <p:cNvPr id="2" name="TextBox 1">
+            <a:extLst>
+              <a:ext uri="{FF2B5EF4-FFF2-40B4-BE49-F238E27FC236}">
+                <a16:creationId xmlns:a16="http://schemas.microsoft.com/office/drawing/2014/main" id="{BB57234E-2283-A64D-BC32-D7086B035DEE}"/>
+              </a:ext>
+            </a:extLst>
+          </p:cNvPr>
+          <p:cNvSpPr txBox="1"/>
+          <p:nvPr/>
+        </p:nvSpPr>
+        <p:spPr>
+          <a:xfrm>
+            <a:off x="220129" y="2151728"/>
+            <a:ext cx="11751743" cy="2554545"/>
+          </a:xfrm>
+          <a:prstGeom prst="rect">
+            <a:avLst/>
+          </a:prstGeom>
+          <a:noFill/>
+        </p:spPr>
+        <p:txBody>
+          <a:bodyPr wrap="none" rtlCol="0">
+            <a:spAutoFit/>
+          </a:bodyPr>
+          <a:lstStyle/>
+          <a:p>
+            <a:pPr algn="ctr"/>
+            <a:r>
+              <a:rPr lang="en-US" sz="16000" b="1" dirty="0">
+                <a:solidFill>
+                  <a:schemeClr val="bg1">
+                    <a:lumMod val="85000"/>
+                  </a:schemeClr>
+                </a:solidFill>
+                <a:latin typeface="Arial Narrow" panose="020B0604020202020204" pitchFamily="34" charset="0"/>
+                <a:cs typeface="Arial Narrow" panose="020B0604020202020204" pitchFamily="34" charset="0"/>
+              </a:rPr>
+              <a:t>Demo     Video</a:t>
+            </a:r>
+          </a:p>
+        </p:txBody>
+      </p:sp>
+      <p:sp>
+        <p:nvSpPr>
+          <p:cNvPr id="10" name="Rectangle 9">
+            <a:extLst>
+              <a:ext uri="{FF2B5EF4-FFF2-40B4-BE49-F238E27FC236}">
+                <a16:creationId xmlns:a16="http://schemas.microsoft.com/office/drawing/2014/main" id="{03C4B759-3F78-4044-8532-61D14F15C2A3}"/>
+              </a:ext>
+            </a:extLst>
+          </p:cNvPr>
+          <p:cNvSpPr/>
+          <p:nvPr/>
+        </p:nvSpPr>
+        <p:spPr>
+          <a:xfrm>
+            <a:off x="5398214" y="0"/>
+            <a:ext cx="1395573" cy="6858000"/>
+          </a:xfrm>
+          <a:prstGeom prst="rect">
+            <a:avLst/>
+          </a:prstGeom>
+          <a:solidFill>
+            <a:schemeClr val="tx1">
+              <a:lumMod val="85000"/>
+              <a:lumOff val="15000"/>
+            </a:schemeClr>
+          </a:solidFill>
+          <a:ln>
+            <a:noFill/>
+          </a:ln>
+        </p:spPr>
+        <p:style>
+          <a:lnRef idx="2">
+            <a:schemeClr val="accent1">
+              <a:shade val="50000"/>
+            </a:schemeClr>
+          </a:lnRef>
+          <a:fillRef idx="1">
+            <a:schemeClr val="accent1"/>
+          </a:fillRef>
+          <a:effectRef idx="0">
+            <a:schemeClr val="accent1"/>
+          </a:effectRef>
+          <a:fontRef idx="minor">
+            <a:schemeClr val="lt1"/>
+          </a:fontRef>
+        </p:style>
+        <p:txBody>
+          <a:bodyPr rtlCol="0" anchor="ctr"/>
+          <a:lstStyle/>
+          <a:p>
+            <a:pPr algn="ctr"/>
+            <a:endParaRPr lang="en-US" dirty="0"/>
+          </a:p>
+        </p:txBody>
+      </p:sp>
+    </p:spTree>
+    <p:extLst>
+      <p:ext uri="{BB962C8B-B14F-4D97-AF65-F5344CB8AC3E}">
+        <p14:creationId xmlns:p14="http://schemas.microsoft.com/office/powerpoint/2010/main" val="1349766613"/>
+      </p:ext>
+    </p:extLst>
+  </p:cSld>
+  <p:clrMapOvr>
+    <a:masterClrMapping/>
+  </p:clrMapOvr>
+</p:sld>
+</file>
+
+<file path=ppt/slides/slide3.xml><?xml version="1.0" encoding="utf-8"?>
+<p:sld xmlns:a="http://schemas.openxmlformats.org/drawingml/2006/main" xmlns:r="http://schemas.openxmlformats.org/officeDocument/2006/relationships" xmlns:p="http://schemas.openxmlformats.org/presentationml/2006/main">
+  <p:cSld>
+    <p:spTree>
+      <p:nvGrpSpPr>
+        <p:cNvPr id="1" name=""/>
+        <p:cNvGrpSpPr/>
+        <p:nvPr/>
+      </p:nvGrpSpPr>
+      <p:grpSpPr>
+        <a:xfrm>
+          <a:off x="0" y="0"/>
+          <a:ext cx="0" cy="0"/>
+          <a:chOff x="0" y="0"/>
+          <a:chExt cx="0" cy="0"/>
+        </a:xfrm>
+      </p:grpSpPr>
+      <p:sp>
+        <p:nvSpPr>
           <p:cNvPr id="3" name="Rectangle 2">
             <a:extLst>
               <a:ext uri="{FF2B5EF4-FFF2-40B4-BE49-F238E27FC236}">

</xml_diff>

<commit_message>
Refactored TOC and front matter
</commit_message>
<xml_diff>
--- a/graphics/graphics.pptx
+++ b/graphics/graphics.pptx
@@ -6,8 +6,9 @@
   </p:sldMasterIdLst>
   <p:sldIdLst>
     <p:sldId id="256" r:id="rId2"/>
-    <p:sldId id="258" r:id="rId3"/>
-    <p:sldId id="257" r:id="rId4"/>
+    <p:sldId id="259" r:id="rId3"/>
+    <p:sldId id="258" r:id="rId4"/>
+    <p:sldId id="257" r:id="rId5"/>
   </p:sldIdLst>
   <p:sldSz cx="12192000" cy="6858000"/>
   <p:notesSz cx="6858000" cy="9144000"/>
@@ -261,7 +262,7 @@
           <a:p>
             <a:fld id="{F029AC13-4324-FA42-95DE-A805E72DB70F}" type="datetimeFigureOut">
               <a:rPr lang="en-US" smtClean="0"/>
-              <a:t>9/10/19</a:t>
+              <a:t>12/18/19</a:t>
             </a:fld>
             <a:endParaRPr lang="en-US"/>
           </a:p>
@@ -459,7 +460,7 @@
           <a:p>
             <a:fld id="{F029AC13-4324-FA42-95DE-A805E72DB70F}" type="datetimeFigureOut">
               <a:rPr lang="en-US" smtClean="0"/>
-              <a:t>9/10/19</a:t>
+              <a:t>12/18/19</a:t>
             </a:fld>
             <a:endParaRPr lang="en-US"/>
           </a:p>
@@ -667,7 +668,7 @@
           <a:p>
             <a:fld id="{F029AC13-4324-FA42-95DE-A805E72DB70F}" type="datetimeFigureOut">
               <a:rPr lang="en-US" smtClean="0"/>
-              <a:t>9/10/19</a:t>
+              <a:t>12/18/19</a:t>
             </a:fld>
             <a:endParaRPr lang="en-US"/>
           </a:p>
@@ -865,7 +866,7 @@
           <a:p>
             <a:fld id="{F029AC13-4324-FA42-95DE-A805E72DB70F}" type="datetimeFigureOut">
               <a:rPr lang="en-US" smtClean="0"/>
-              <a:t>9/10/19</a:t>
+              <a:t>12/18/19</a:t>
             </a:fld>
             <a:endParaRPr lang="en-US"/>
           </a:p>
@@ -1140,7 +1141,7 @@
           <a:p>
             <a:fld id="{F029AC13-4324-FA42-95DE-A805E72DB70F}" type="datetimeFigureOut">
               <a:rPr lang="en-US" smtClean="0"/>
-              <a:t>9/10/19</a:t>
+              <a:t>12/18/19</a:t>
             </a:fld>
             <a:endParaRPr lang="en-US"/>
           </a:p>
@@ -1405,7 +1406,7 @@
           <a:p>
             <a:fld id="{F029AC13-4324-FA42-95DE-A805E72DB70F}" type="datetimeFigureOut">
               <a:rPr lang="en-US" smtClean="0"/>
-              <a:t>9/10/19</a:t>
+              <a:t>12/18/19</a:t>
             </a:fld>
             <a:endParaRPr lang="en-US"/>
           </a:p>
@@ -1817,7 +1818,7 @@
           <a:p>
             <a:fld id="{F029AC13-4324-FA42-95DE-A805E72DB70F}" type="datetimeFigureOut">
               <a:rPr lang="en-US" smtClean="0"/>
-              <a:t>9/10/19</a:t>
+              <a:t>12/18/19</a:t>
             </a:fld>
             <a:endParaRPr lang="en-US"/>
           </a:p>
@@ -1958,7 +1959,7 @@
           <a:p>
             <a:fld id="{F029AC13-4324-FA42-95DE-A805E72DB70F}" type="datetimeFigureOut">
               <a:rPr lang="en-US" smtClean="0"/>
-              <a:t>9/10/19</a:t>
+              <a:t>12/18/19</a:t>
             </a:fld>
             <a:endParaRPr lang="en-US"/>
           </a:p>
@@ -2071,7 +2072,7 @@
           <a:p>
             <a:fld id="{F029AC13-4324-FA42-95DE-A805E72DB70F}" type="datetimeFigureOut">
               <a:rPr lang="en-US" smtClean="0"/>
-              <a:t>9/10/19</a:t>
+              <a:t>12/18/19</a:t>
             </a:fld>
             <a:endParaRPr lang="en-US"/>
           </a:p>
@@ -2382,7 +2383,7 @@
           <a:p>
             <a:fld id="{F029AC13-4324-FA42-95DE-A805E72DB70F}" type="datetimeFigureOut">
               <a:rPr lang="en-US" smtClean="0"/>
-              <a:t>9/10/19</a:t>
+              <a:t>12/18/19</a:t>
             </a:fld>
             <a:endParaRPr lang="en-US"/>
           </a:p>
@@ -2670,7 +2671,7 @@
           <a:p>
             <a:fld id="{F029AC13-4324-FA42-95DE-A805E72DB70F}" type="datetimeFigureOut">
               <a:rPr lang="en-US" smtClean="0"/>
-              <a:t>9/10/19</a:t>
+              <a:t>12/18/19</a:t>
             </a:fld>
             <a:endParaRPr lang="en-US"/>
           </a:p>
@@ -2911,7 +2912,7 @@
           <a:p>
             <a:fld id="{F029AC13-4324-FA42-95DE-A805E72DB70F}" type="datetimeFigureOut">
               <a:rPr lang="en-US" smtClean="0"/>
-              <a:t>9/10/19</a:t>
+              <a:t>12/18/19</a:t>
             </a:fld>
             <a:endParaRPr lang="en-US"/>
           </a:p>
@@ -3342,6 +3343,196 @@
         </p:nvGrpSpPr>
         <p:grpSpPr>
           <a:xfrm>
+            <a:off x="904661" y="1900241"/>
+            <a:ext cx="9464419" cy="2547078"/>
+            <a:chOff x="1116039" y="1276403"/>
+            <a:chExt cx="9464419" cy="2547078"/>
+          </a:xfrm>
+        </p:grpSpPr>
+        <p:sp>
+          <p:nvSpPr>
+            <p:cNvPr id="4" name="TextBox 3">
+              <a:extLst>
+                <a:ext uri="{FF2B5EF4-FFF2-40B4-BE49-F238E27FC236}">
+                  <a16:creationId xmlns:a16="http://schemas.microsoft.com/office/drawing/2014/main" id="{6594E95B-F5AE-034E-9197-5A52A032A098}"/>
+                </a:ext>
+              </a:extLst>
+            </p:cNvPr>
+            <p:cNvSpPr txBox="1"/>
+            <p:nvPr/>
+          </p:nvSpPr>
+          <p:spPr>
+            <a:xfrm>
+              <a:off x="1116039" y="1276403"/>
+              <a:ext cx="7581901" cy="1569660"/>
+            </a:xfrm>
+            <a:prstGeom prst="rect">
+              <a:avLst/>
+            </a:prstGeom>
+            <a:noFill/>
+          </p:spPr>
+          <p:txBody>
+            <a:bodyPr wrap="square" rtlCol="0">
+              <a:spAutoFit/>
+            </a:bodyPr>
+            <a:lstStyle/>
+            <a:p>
+              <a:pPr algn="ctr"/>
+              <a:r>
+                <a:rPr lang="en-US" sz="9600" b="1" i="1" spc="-400" dirty="0">
+                  <a:solidFill>
+                    <a:srgbClr val="990000"/>
+                  </a:solidFill>
+                  <a:latin typeface="Arial Narrow" panose="020B0604020202020204" pitchFamily="34" charset="0"/>
+                  <a:cs typeface="Arial Narrow" panose="020B0604020202020204" pitchFamily="34" charset="0"/>
+                </a:rPr>
+                <a:t>Ruby on Rails</a:t>
+              </a:r>
+            </a:p>
+          </p:txBody>
+        </p:sp>
+        <p:sp>
+          <p:nvSpPr>
+            <p:cNvPr id="6" name="TextBox 5">
+              <a:extLst>
+                <a:ext uri="{FF2B5EF4-FFF2-40B4-BE49-F238E27FC236}">
+                  <a16:creationId xmlns:a16="http://schemas.microsoft.com/office/drawing/2014/main" id="{098EC516-4321-2E40-98F4-DFA632EB2FB5}"/>
+                </a:ext>
+              </a:extLst>
+            </p:cNvPr>
+            <p:cNvSpPr txBox="1"/>
+            <p:nvPr/>
+          </p:nvSpPr>
+          <p:spPr>
+            <a:xfrm>
+              <a:off x="2998557" y="2253821"/>
+              <a:ext cx="7581901" cy="1569660"/>
+            </a:xfrm>
+            <a:prstGeom prst="rect">
+              <a:avLst/>
+            </a:prstGeom>
+            <a:noFill/>
+          </p:spPr>
+          <p:txBody>
+            <a:bodyPr wrap="square" rtlCol="0">
+              <a:spAutoFit/>
+            </a:bodyPr>
+            <a:lstStyle/>
+            <a:p>
+              <a:pPr algn="ctr"/>
+              <a:r>
+                <a:rPr lang="en-US" sz="9600" b="1" i="1" spc="-400" dirty="0">
+                  <a:solidFill>
+                    <a:srgbClr val="990000"/>
+                  </a:solidFill>
+                  <a:latin typeface="Arial Narrow" panose="020B0604020202020204" pitchFamily="34" charset="0"/>
+                  <a:cs typeface="Arial Narrow" panose="020B0604020202020204" pitchFamily="34" charset="0"/>
+                </a:rPr>
+                <a:t>Demos 'n' Deets</a:t>
+              </a:r>
+            </a:p>
+          </p:txBody>
+        </p:sp>
+      </p:grpSp>
+      <p:sp>
+        <p:nvSpPr>
+          <p:cNvPr id="3" name="Right Arrow 2">
+            <a:extLst>
+              <a:ext uri="{FF2B5EF4-FFF2-40B4-BE49-F238E27FC236}">
+                <a16:creationId xmlns:a16="http://schemas.microsoft.com/office/drawing/2014/main" id="{E722BDBE-D324-374D-84E3-6E0179880EAB}"/>
+              </a:ext>
+            </a:extLst>
+          </p:cNvPr>
+          <p:cNvSpPr/>
+          <p:nvPr/>
+        </p:nvSpPr>
+        <p:spPr>
+          <a:xfrm>
+            <a:off x="1204159" y="1367232"/>
+            <a:ext cx="10516786" cy="3720157"/>
+          </a:xfrm>
+          <a:prstGeom prst="rightArrow">
+            <a:avLst>
+              <a:gd name="adj1" fmla="val 73348"/>
+              <a:gd name="adj2" fmla="val 33876"/>
+            </a:avLst>
+          </a:prstGeom>
+          <a:noFill/>
+          <a:ln w="76200">
+            <a:solidFill>
+              <a:srgbClr val="990000"/>
+            </a:solidFill>
+          </a:ln>
+        </p:spPr>
+        <p:style>
+          <a:lnRef idx="2">
+            <a:schemeClr val="accent1">
+              <a:shade val="50000"/>
+            </a:schemeClr>
+          </a:lnRef>
+          <a:fillRef idx="1">
+            <a:schemeClr val="accent1"/>
+          </a:fillRef>
+          <a:effectRef idx="0">
+            <a:schemeClr val="accent1"/>
+          </a:effectRef>
+          <a:fontRef idx="minor">
+            <a:schemeClr val="lt1"/>
+          </a:fontRef>
+        </p:style>
+        <p:txBody>
+          <a:bodyPr rtlCol="0" anchor="ctr"/>
+          <a:lstStyle/>
+          <a:p>
+            <a:pPr algn="ctr"/>
+            <a:endParaRPr lang="en-US"/>
+          </a:p>
+        </p:txBody>
+      </p:sp>
+    </p:spTree>
+    <p:extLst>
+      <p:ext uri="{BB962C8B-B14F-4D97-AF65-F5344CB8AC3E}">
+        <p14:creationId xmlns:p14="http://schemas.microsoft.com/office/powerpoint/2010/main" val="3786149594"/>
+      </p:ext>
+    </p:extLst>
+  </p:cSld>
+  <p:clrMapOvr>
+    <a:masterClrMapping/>
+  </p:clrMapOvr>
+</p:sld>
+</file>
+
+<file path=ppt/slides/slide2.xml><?xml version="1.0" encoding="utf-8"?>
+<p:sld xmlns:a="http://schemas.openxmlformats.org/drawingml/2006/main" xmlns:r="http://schemas.openxmlformats.org/officeDocument/2006/relationships" xmlns:p="http://schemas.openxmlformats.org/presentationml/2006/main">
+  <p:cSld>
+    <p:spTree>
+      <p:nvGrpSpPr>
+        <p:cNvPr id="1" name=""/>
+        <p:cNvGrpSpPr/>
+        <p:nvPr/>
+      </p:nvGrpSpPr>
+      <p:grpSpPr>
+        <a:xfrm>
+          <a:off x="0" y="0"/>
+          <a:ext cx="0" cy="0"/>
+          <a:chOff x="0" y="0"/>
+          <a:chExt cx="0" cy="0"/>
+        </a:xfrm>
+      </p:grpSpPr>
+      <p:grpSp>
+        <p:nvGrpSpPr>
+          <p:cNvPr id="7" name="Group 6">
+            <a:extLst>
+              <a:ext uri="{FF2B5EF4-FFF2-40B4-BE49-F238E27FC236}">
+                <a16:creationId xmlns:a16="http://schemas.microsoft.com/office/drawing/2014/main" id="{960F0BC0-BA2C-8640-89FC-4C88E0B76600}"/>
+              </a:ext>
+            </a:extLst>
+          </p:cNvPr>
+          <p:cNvGrpSpPr/>
+          <p:nvPr/>
+        </p:nvGrpSpPr>
+        <p:grpSpPr>
+          <a:xfrm>
             <a:off x="2146165" y="964051"/>
             <a:ext cx="7740786" cy="2505014"/>
             <a:chOff x="2146165" y="964051"/>
@@ -3530,7 +3721,7 @@
     </p:spTree>
     <p:extLst>
       <p:ext uri="{BB962C8B-B14F-4D97-AF65-F5344CB8AC3E}">
-        <p14:creationId xmlns:p14="http://schemas.microsoft.com/office/powerpoint/2010/main" val="3786149594"/>
+        <p14:creationId xmlns:p14="http://schemas.microsoft.com/office/powerpoint/2010/main" val="132831794"/>
       </p:ext>
     </p:extLst>
   </p:cSld>
@@ -3540,7 +3731,7 @@
 </p:sld>
 </file>
 
-<file path=ppt/slides/slide2.xml><?xml version="1.0" encoding="utf-8"?>
+<file path=ppt/slides/slide3.xml><?xml version="1.0" encoding="utf-8"?>
 <p:sld xmlns:a="http://schemas.openxmlformats.org/drawingml/2006/main" xmlns:r="http://schemas.openxmlformats.org/officeDocument/2006/relationships" xmlns:p="http://schemas.openxmlformats.org/presentationml/2006/main">
   <p:cSld>
     <p:spTree>
@@ -3724,7 +3915,7 @@
 </p:sld>
 </file>
 
-<file path=ppt/slides/slide3.xml><?xml version="1.0" encoding="utf-8"?>
+<file path=ppt/slides/slide4.xml><?xml version="1.0" encoding="utf-8"?>
 <p:sld xmlns:a="http://schemas.openxmlformats.org/drawingml/2006/main" xmlns:r="http://schemas.openxmlformats.org/officeDocument/2006/relationships" xmlns:p="http://schemas.openxmlformats.org/presentationml/2006/main">
   <p:cSld>
     <p:spTree>

</xml_diff>